<commit_message>
Adjust horizontal scaling diagram and example
</commit_message>
<xml_diff>
--- a/contents/data/nosql/diagrams.pptx
+++ b/contents/data/nosql/diagrams.pptx
@@ -6997,7 +6997,7 @@
         </p:nvSpPr>
         <p:spPr>
           <a:xfrm>
-            <a:off x="2948348" y="3667074"/>
+            <a:off x="1131738" y="3258642"/>
             <a:ext cx="1350967" cy="1714474"/>
           </a:xfrm>
           <a:prstGeom prst="flowChartMagneticDisk">
@@ -7047,8 +7047,8 @@
         </p:nvSpPr>
         <p:spPr>
           <a:xfrm>
-            <a:off x="5193216" y="3414945"/>
-            <a:ext cx="1443402" cy="2218731"/>
+            <a:off x="3376607" y="3258642"/>
+            <a:ext cx="1262448" cy="1714474"/>
           </a:xfrm>
           <a:prstGeom prst="rect">
             <a:avLst/>
@@ -7130,8 +7130,8 @@
         </p:nvCxnSpPr>
         <p:spPr>
           <a:xfrm>
-            <a:off x="4299315" y="4524311"/>
-            <a:ext cx="893901" cy="0"/>
+            <a:off x="2482705" y="4115879"/>
+            <a:ext cx="893902" cy="0"/>
           </a:xfrm>
           <a:prstGeom prst="straightConnector1">
             <a:avLst/>
@@ -7172,9 +7172,9 @@
           <p:nvPr/>
         </p:nvCxnSpPr>
         <p:spPr>
-          <a:xfrm flipV="1">
-            <a:off x="6636618" y="4523183"/>
-            <a:ext cx="819144" cy="1128"/>
+          <a:xfrm>
+            <a:off x="4639055" y="4115879"/>
+            <a:ext cx="933971" cy="0"/>
           </a:xfrm>
           <a:prstGeom prst="straightConnector1">
             <a:avLst/>
@@ -7212,8 +7212,8 @@
         </p:nvSpPr>
         <p:spPr>
           <a:xfrm>
-            <a:off x="7455762" y="3385372"/>
-            <a:ext cx="1535837" cy="2275622"/>
+            <a:off x="5573026" y="3258642"/>
+            <a:ext cx="1328575" cy="1714474"/>
           </a:xfrm>
           <a:prstGeom prst="flowChartAlternateProcess">
             <a:avLst/>
@@ -7273,7 +7273,7 @@
         </p:nvSpPr>
         <p:spPr>
           <a:xfrm>
-            <a:off x="2948348" y="772126"/>
+            <a:off x="1131740" y="997678"/>
             <a:ext cx="1350967" cy="1714474"/>
           </a:xfrm>
           <a:prstGeom prst="flowChartMagneticDisk">
@@ -7323,8 +7323,8 @@
         </p:nvSpPr>
         <p:spPr>
           <a:xfrm>
-            <a:off x="5193216" y="519997"/>
-            <a:ext cx="1443402" cy="2218731"/>
+            <a:off x="3376608" y="997678"/>
+            <a:ext cx="1262448" cy="1714474"/>
           </a:xfrm>
           <a:prstGeom prst="rect">
             <a:avLst/>
@@ -7406,7 +7406,7 @@
         </p:nvCxnSpPr>
         <p:spPr>
           <a:xfrm>
-            <a:off x="4299315" y="1629363"/>
+            <a:off x="2482707" y="1854915"/>
             <a:ext cx="893901" cy="0"/>
           </a:xfrm>
           <a:prstGeom prst="straightConnector1">
@@ -7448,9 +7448,9 @@
           <p:nvPr/>
         </p:nvCxnSpPr>
         <p:spPr>
-          <a:xfrm flipV="1">
-            <a:off x="6636618" y="1628235"/>
-            <a:ext cx="819144" cy="1128"/>
+          <a:xfrm>
+            <a:off x="4639056" y="1854915"/>
+            <a:ext cx="933972" cy="0"/>
           </a:xfrm>
           <a:prstGeom prst="straightConnector1">
             <a:avLst/>
@@ -7488,8 +7488,8 @@
         </p:nvSpPr>
         <p:spPr>
           <a:xfrm>
-            <a:off x="7455762" y="490424"/>
-            <a:ext cx="1535837" cy="2275622"/>
+            <a:off x="5573028" y="997678"/>
+            <a:ext cx="1328574" cy="1714474"/>
           </a:xfrm>
           <a:prstGeom prst="flowChartAlternateProcess">
             <a:avLst/>
@@ -7535,6 +7535,204 @@
           </a:p>
         </p:txBody>
       </p:sp>
+      <p:sp>
+        <p:nvSpPr>
+          <p:cNvPr id="34" name="Flowchart: Alternate Process 33">
+            <a:extLst>
+              <a:ext uri="{FF2B5EF4-FFF2-40B4-BE49-F238E27FC236}">
+                <a16:creationId xmlns:a16="http://schemas.microsoft.com/office/drawing/2014/main" id="{11BF4676-6495-4BA2-8E5A-FA23984913EB}"/>
+              </a:ext>
+            </a:extLst>
+          </p:cNvPr>
+          <p:cNvSpPr/>
+          <p:nvPr/>
+        </p:nvSpPr>
+        <p:spPr>
+          <a:xfrm>
+            <a:off x="7418640" y="1562591"/>
+            <a:ext cx="981648" cy="584648"/>
+          </a:xfrm>
+          <a:prstGeom prst="flowChartAlternateProcess">
+            <a:avLst/>
+          </a:prstGeom>
+          <a:solidFill>
+            <a:schemeClr val="bg1"/>
+          </a:solidFill>
+        </p:spPr>
+        <p:style>
+          <a:lnRef idx="2">
+            <a:schemeClr val="accent1">
+              <a:shade val="50000"/>
+            </a:schemeClr>
+          </a:lnRef>
+          <a:fillRef idx="1">
+            <a:schemeClr val="accent1"/>
+          </a:fillRef>
+          <a:effectRef idx="0">
+            <a:schemeClr val="accent1"/>
+          </a:effectRef>
+          <a:fontRef idx="minor">
+            <a:schemeClr val="lt1"/>
+          </a:fontRef>
+        </p:style>
+        <p:txBody>
+          <a:bodyPr rtlCol="0" anchor="ctr"/>
+          <a:lstStyle/>
+          <a:p>
+            <a:pPr algn="ctr"/>
+            <a:r>
+              <a:rPr lang="en-US" sz="1400" dirty="0">
+                <a:solidFill>
+                  <a:schemeClr val="tx1"/>
+                </a:solidFill>
+              </a:rPr>
+              <a:t>title: “apple”</a:t>
+            </a:r>
+          </a:p>
+        </p:txBody>
+      </p:sp>
+      <p:sp>
+        <p:nvSpPr>
+          <p:cNvPr id="35" name="Flowchart: Alternate Process 34">
+            <a:extLst>
+              <a:ext uri="{FF2B5EF4-FFF2-40B4-BE49-F238E27FC236}">
+                <a16:creationId xmlns:a16="http://schemas.microsoft.com/office/drawing/2014/main" id="{47F200CC-055B-43E0-9EFC-5429AAC3A7C5}"/>
+              </a:ext>
+            </a:extLst>
+          </p:cNvPr>
+          <p:cNvSpPr/>
+          <p:nvPr/>
+        </p:nvSpPr>
+        <p:spPr>
+          <a:xfrm>
+            <a:off x="7418640" y="3823555"/>
+            <a:ext cx="981648" cy="584648"/>
+          </a:xfrm>
+          <a:prstGeom prst="flowChartAlternateProcess">
+            <a:avLst/>
+          </a:prstGeom>
+          <a:solidFill>
+            <a:schemeClr val="bg1"/>
+          </a:solidFill>
+        </p:spPr>
+        <p:style>
+          <a:lnRef idx="2">
+            <a:schemeClr val="accent1">
+              <a:shade val="50000"/>
+            </a:schemeClr>
+          </a:lnRef>
+          <a:fillRef idx="1">
+            <a:schemeClr val="accent1"/>
+          </a:fillRef>
+          <a:effectRef idx="0">
+            <a:schemeClr val="accent1"/>
+          </a:effectRef>
+          <a:fontRef idx="minor">
+            <a:schemeClr val="lt1"/>
+          </a:fontRef>
+        </p:style>
+        <p:txBody>
+          <a:bodyPr rtlCol="0" anchor="ctr"/>
+          <a:lstStyle/>
+          <a:p>
+            <a:pPr algn="ctr"/>
+            <a:r>
+              <a:rPr lang="en-US" sz="1400" dirty="0">
+                <a:solidFill>
+                  <a:schemeClr val="tx1"/>
+                </a:solidFill>
+              </a:rPr>
+              <a:t>title: “orange”</a:t>
+            </a:r>
+          </a:p>
+        </p:txBody>
+      </p:sp>
+      <p:cxnSp>
+        <p:nvCxnSpPr>
+          <p:cNvPr id="37" name="Straight Arrow Connector 36">
+            <a:extLst>
+              <a:ext uri="{FF2B5EF4-FFF2-40B4-BE49-F238E27FC236}">
+                <a16:creationId xmlns:a16="http://schemas.microsoft.com/office/drawing/2014/main" id="{C71C391A-37FB-42DB-9845-8E1C49299D4F}"/>
+              </a:ext>
+            </a:extLst>
+          </p:cNvPr>
+          <p:cNvCxnSpPr>
+            <a:cxnSpLocks/>
+            <a:stCxn id="48" idx="3"/>
+            <a:endCxn id="34" idx="1"/>
+          </p:cNvCxnSpPr>
+          <p:nvPr/>
+        </p:nvCxnSpPr>
+        <p:spPr>
+          <a:xfrm>
+            <a:off x="6901602" y="1854915"/>
+            <a:ext cx="517038" cy="0"/>
+          </a:xfrm>
+          <a:prstGeom prst="straightConnector1">
+            <a:avLst/>
+          </a:prstGeom>
+          <a:ln>
+            <a:tailEnd type="triangle"/>
+          </a:ln>
+        </p:spPr>
+        <p:style>
+          <a:lnRef idx="1">
+            <a:schemeClr val="accent1"/>
+          </a:lnRef>
+          <a:fillRef idx="0">
+            <a:schemeClr val="accent1"/>
+          </a:fillRef>
+          <a:effectRef idx="0">
+            <a:schemeClr val="accent1"/>
+          </a:effectRef>
+          <a:fontRef idx="minor">
+            <a:schemeClr val="tx1"/>
+          </a:fontRef>
+        </p:style>
+      </p:cxnSp>
+      <p:cxnSp>
+        <p:nvCxnSpPr>
+          <p:cNvPr id="40" name="Straight Arrow Connector 39">
+            <a:extLst>
+              <a:ext uri="{FF2B5EF4-FFF2-40B4-BE49-F238E27FC236}">
+                <a16:creationId xmlns:a16="http://schemas.microsoft.com/office/drawing/2014/main" id="{92755743-64CF-45A0-A64A-38EAE6AF2289}"/>
+              </a:ext>
+            </a:extLst>
+          </p:cNvPr>
+          <p:cNvCxnSpPr>
+            <a:cxnSpLocks/>
+            <a:stCxn id="33" idx="3"/>
+            <a:endCxn id="35" idx="1"/>
+          </p:cNvCxnSpPr>
+          <p:nvPr/>
+        </p:nvCxnSpPr>
+        <p:spPr>
+          <a:xfrm>
+            <a:off x="6901601" y="4115879"/>
+            <a:ext cx="517039" cy="0"/>
+          </a:xfrm>
+          <a:prstGeom prst="straightConnector1">
+            <a:avLst/>
+          </a:prstGeom>
+          <a:ln>
+            <a:tailEnd type="triangle"/>
+          </a:ln>
+        </p:spPr>
+        <p:style>
+          <a:lnRef idx="1">
+            <a:schemeClr val="accent1"/>
+          </a:lnRef>
+          <a:fillRef idx="0">
+            <a:schemeClr val="accent1"/>
+          </a:fillRef>
+          <a:effectRef idx="0">
+            <a:schemeClr val="accent1"/>
+          </a:effectRef>
+          <a:fontRef idx="minor">
+            <a:schemeClr val="tx1"/>
+          </a:fontRef>
+        </p:style>
+      </p:cxnSp>
     </p:spTree>
     <p:extLst>
       <p:ext uri="{BB962C8B-B14F-4D97-AF65-F5344CB8AC3E}">

</xml_diff>